<commit_message>
refractor: update powerpoint relatorio
</commit_message>
<xml_diff>
--- a/acomp/trabalhos_praticos/Apresentação ADC - Assembly.pptx
+++ b/acomp/trabalhos_praticos/Apresentação ADC - Assembly.pptx
@@ -144,7 +144,7 @@
       </p:grpSpPr>
       <p:sp>
         <p:nvSpPr>
-          <p:cNvPr id="1236942172" name="Header Placeholder 1"/>
+          <p:cNvPr id="1608991101" name="Header Placeholder 1"/>
           <p:cNvSpPr>
             <a:spLocks noGrp="1"/>
           </p:cNvSpPr>
@@ -178,7 +178,7 @@
       </p:sp>
       <p:sp>
         <p:nvSpPr>
-          <p:cNvPr id="1292858033" name="Date Placeholder 2"/>
+          <p:cNvPr id="1507281192" name="Date Placeholder 2"/>
           <p:cNvSpPr>
             <a:spLocks noGrp="1"/>
           </p:cNvSpPr>
@@ -212,7 +212,7 @@
       </p:sp>
       <p:sp>
         <p:nvSpPr>
-          <p:cNvPr id="1761122356" name="Date Placeholder 2"/>
+          <p:cNvPr id="972990340" name="Date Placeholder 2"/>
           <p:cNvSpPr>
             <a:spLocks noGrp="1"/>
           </p:cNvSpPr>
@@ -246,7 +246,7 @@
       </p:sp>
       <p:sp>
         <p:nvSpPr>
-          <p:cNvPr id="2107370017" name="Notes Placeholder 4"/>
+          <p:cNvPr id="874467365" name="Notes Placeholder 4"/>
           <p:cNvSpPr>
             <a:spLocks noGrp="1"/>
           </p:cNvSpPr>
@@ -276,7 +276,7 @@
       </p:sp>
       <p:sp>
         <p:nvSpPr>
-          <p:cNvPr id="189989666" name="Footer Placeholder 5"/>
+          <p:cNvPr id="2021223704" name="Footer Placeholder 5"/>
           <p:cNvSpPr>
             <a:spLocks noGrp="1"/>
           </p:cNvSpPr>
@@ -310,7 +310,7 @@
       </p:sp>
       <p:sp>
         <p:nvSpPr>
-          <p:cNvPr id="1983375963" name="Slide Number Placeholder 6"/>
+          <p:cNvPr id="2038025503" name="Slide Number Placeholder 6"/>
           <p:cNvSpPr>
             <a:spLocks noGrp="1"/>
           </p:cNvSpPr>
@@ -459,7 +459,7 @@
       </p:grpSpPr>
       <p:sp>
         <p:nvSpPr>
-          <p:cNvPr id="1360454378" name="Slide Image Placeholder 1"/>
+          <p:cNvPr id="1962770188" name="Slide Image Placeholder 1"/>
           <p:cNvSpPr>
             <a:spLocks noChangeAspect="1" noGrp="1" noRot="1"/>
           </p:cNvSpPr>
@@ -471,7 +471,7 @@
       </p:sp>
       <p:sp>
         <p:nvSpPr>
-          <p:cNvPr id="357690773" name="Notes Placeholder 2"/>
+          <p:cNvPr id="1524659537" name="Notes Placeholder 2"/>
           <p:cNvSpPr>
             <a:spLocks noGrp="1"/>
           </p:cNvSpPr>
@@ -493,7 +493,7 @@
       </p:sp>
       <p:sp>
         <p:nvSpPr>
-          <p:cNvPr id="1360878655" name="Slide Number Placeholder 3"/>
+          <p:cNvPr id="1500161434" name="Slide Number Placeholder 3"/>
           <p:cNvSpPr>
             <a:spLocks noGrp="1"/>
           </p:cNvSpPr>
@@ -544,7 +544,7 @@
       </p:grpSpPr>
       <p:sp>
         <p:nvSpPr>
-          <p:cNvPr id="254766623" name="Slide Image Placeholder 1"/>
+          <p:cNvPr id="2025127108" name="Slide Image Placeholder 1"/>
           <p:cNvSpPr>
             <a:spLocks noChangeAspect="1" noGrp="1" noRot="1"/>
           </p:cNvSpPr>
@@ -556,7 +556,7 @@
       </p:sp>
       <p:sp>
         <p:nvSpPr>
-          <p:cNvPr id="425553782" name="Notes Placeholder 2"/>
+          <p:cNvPr id="1543078876" name="Notes Placeholder 2"/>
           <p:cNvSpPr>
             <a:spLocks noGrp="1"/>
           </p:cNvSpPr>
@@ -578,7 +578,7 @@
       </p:sp>
       <p:sp>
         <p:nvSpPr>
-          <p:cNvPr id="1403062331" name="Slide Number Placeholder 3"/>
+          <p:cNvPr id="882024431" name="Slide Number Placeholder 3"/>
           <p:cNvSpPr>
             <a:spLocks noGrp="1"/>
           </p:cNvSpPr>
@@ -629,7 +629,7 @@
       </p:grpSpPr>
       <p:sp>
         <p:nvSpPr>
-          <p:cNvPr id="1193363469" name="Slide Image Placeholder 1"/>
+          <p:cNvPr id="286962117" name="Slide Image Placeholder 1"/>
           <p:cNvSpPr>
             <a:spLocks noChangeAspect="1" noGrp="1" noRot="1"/>
           </p:cNvSpPr>
@@ -641,7 +641,7 @@
       </p:sp>
       <p:sp>
         <p:nvSpPr>
-          <p:cNvPr id="610881043" name="Notes Placeholder 2"/>
+          <p:cNvPr id="1041402279" name="Notes Placeholder 2"/>
           <p:cNvSpPr>
             <a:spLocks noGrp="1"/>
           </p:cNvSpPr>
@@ -663,7 +663,7 @@
       </p:sp>
       <p:sp>
         <p:nvSpPr>
-          <p:cNvPr id="310649022" name="Slide Number Placeholder 3"/>
+          <p:cNvPr id="758120396" name="Slide Number Placeholder 3"/>
           <p:cNvSpPr>
             <a:spLocks noGrp="1"/>
           </p:cNvSpPr>
@@ -714,7 +714,7 @@
       </p:grpSpPr>
       <p:sp>
         <p:nvSpPr>
-          <p:cNvPr id="1991539894" name="Slide Image Placeholder 1"/>
+          <p:cNvPr id="270083786" name="Slide Image Placeholder 1"/>
           <p:cNvSpPr>
             <a:spLocks noChangeAspect="1" noGrp="1" noRot="1"/>
           </p:cNvSpPr>
@@ -726,7 +726,7 @@
       </p:sp>
       <p:sp>
         <p:nvSpPr>
-          <p:cNvPr id="1112113284" name="Notes Placeholder 2"/>
+          <p:cNvPr id="1960717521" name="Notes Placeholder 2"/>
           <p:cNvSpPr>
             <a:spLocks noGrp="1"/>
           </p:cNvSpPr>
@@ -748,7 +748,7 @@
       </p:sp>
       <p:sp>
         <p:nvSpPr>
-          <p:cNvPr id="1720152838" name="Slide Number Placeholder 3"/>
+          <p:cNvPr id="102995879" name="Slide Number Placeholder 3"/>
           <p:cNvSpPr>
             <a:spLocks noGrp="1"/>
           </p:cNvSpPr>
@@ -799,7 +799,7 @@
       </p:grpSpPr>
       <p:sp>
         <p:nvSpPr>
-          <p:cNvPr id="2093226643" name="Slide Image Placeholder 1"/>
+          <p:cNvPr id="420220501" name="Slide Image Placeholder 1"/>
           <p:cNvSpPr>
             <a:spLocks noChangeAspect="1" noGrp="1" noRot="1"/>
           </p:cNvSpPr>
@@ -811,7 +811,7 @@
       </p:sp>
       <p:sp>
         <p:nvSpPr>
-          <p:cNvPr id="1276034813" name="Notes Placeholder 2"/>
+          <p:cNvPr id="916443654" name="Notes Placeholder 2"/>
           <p:cNvSpPr>
             <a:spLocks noGrp="1"/>
           </p:cNvSpPr>
@@ -833,7 +833,7 @@
       </p:sp>
       <p:sp>
         <p:nvSpPr>
-          <p:cNvPr id="1089504748" name="Slide Number Placeholder 3"/>
+          <p:cNvPr id="1605159266" name="Slide Number Placeholder 3"/>
           <p:cNvSpPr>
             <a:spLocks noGrp="1"/>
           </p:cNvSpPr>
@@ -884,7 +884,7 @@
       </p:grpSpPr>
       <p:sp>
         <p:nvSpPr>
-          <p:cNvPr id="1670725283" name="Slide Image Placeholder 1"/>
+          <p:cNvPr id="100731291" name="Slide Image Placeholder 1"/>
           <p:cNvSpPr>
             <a:spLocks noChangeAspect="1" noGrp="1" noRot="1"/>
           </p:cNvSpPr>
@@ -896,7 +896,7 @@
       </p:sp>
       <p:sp>
         <p:nvSpPr>
-          <p:cNvPr id="377115963" name="Notes Placeholder 2"/>
+          <p:cNvPr id="1532352603" name="Notes Placeholder 2"/>
           <p:cNvSpPr>
             <a:spLocks noGrp="1"/>
           </p:cNvSpPr>
@@ -918,7 +918,7 @@
       </p:sp>
       <p:sp>
         <p:nvSpPr>
-          <p:cNvPr id="1439763753" name="Slide Number Placeholder 3"/>
+          <p:cNvPr id="486955839" name="Slide Number Placeholder 3"/>
           <p:cNvSpPr>
             <a:spLocks noGrp="1"/>
           </p:cNvSpPr>
@@ -969,7 +969,7 @@
       </p:grpSpPr>
       <p:sp>
         <p:nvSpPr>
-          <p:cNvPr id="1390002897" name="Slide Image Placeholder 1"/>
+          <p:cNvPr id="2131215270" name="Slide Image Placeholder 1"/>
           <p:cNvSpPr>
             <a:spLocks noChangeAspect="1" noGrp="1" noRot="1"/>
           </p:cNvSpPr>
@@ -981,7 +981,7 @@
       </p:sp>
       <p:sp>
         <p:nvSpPr>
-          <p:cNvPr id="1689664397" name="Notes Placeholder 2"/>
+          <p:cNvPr id="956093987" name="Notes Placeholder 2"/>
           <p:cNvSpPr>
             <a:spLocks noGrp="1"/>
           </p:cNvSpPr>
@@ -1003,7 +1003,7 @@
       </p:sp>
       <p:sp>
         <p:nvSpPr>
-          <p:cNvPr id="1136614012" name="Slide Number Placeholder 3"/>
+          <p:cNvPr id="350510205" name="Slide Number Placeholder 3"/>
           <p:cNvSpPr>
             <a:spLocks noGrp="1"/>
           </p:cNvSpPr>
@@ -1054,7 +1054,7 @@
       </p:grpSpPr>
       <p:sp>
         <p:nvSpPr>
-          <p:cNvPr id="1307496845" name="Slide Image Placeholder 1"/>
+          <p:cNvPr id="187237746" name="Slide Image Placeholder 1"/>
           <p:cNvSpPr>
             <a:spLocks noChangeAspect="1" noGrp="1" noRot="1"/>
           </p:cNvSpPr>
@@ -1066,7 +1066,7 @@
       </p:sp>
       <p:sp>
         <p:nvSpPr>
-          <p:cNvPr id="1016376253" name="Notes Placeholder 2"/>
+          <p:cNvPr id="615678506" name="Notes Placeholder 2"/>
           <p:cNvSpPr>
             <a:spLocks noGrp="1"/>
           </p:cNvSpPr>
@@ -1088,7 +1088,7 @@
       </p:sp>
       <p:sp>
         <p:nvSpPr>
-          <p:cNvPr id="1972343983" name="Slide Number Placeholder 3"/>
+          <p:cNvPr id="833667524" name="Slide Number Placeholder 3"/>
           <p:cNvSpPr>
             <a:spLocks noGrp="1"/>
           </p:cNvSpPr>
@@ -1139,7 +1139,7 @@
       </p:grpSpPr>
       <p:sp>
         <p:nvSpPr>
-          <p:cNvPr id="1125406639" name="Slide Image Placeholder 1"/>
+          <p:cNvPr id="1436941005" name="Slide Image Placeholder 1"/>
           <p:cNvSpPr>
             <a:spLocks noChangeAspect="1" noGrp="1" noRot="1"/>
           </p:cNvSpPr>
@@ -1151,7 +1151,7 @@
       </p:sp>
       <p:sp>
         <p:nvSpPr>
-          <p:cNvPr id="1986966731" name="Notes Placeholder 2"/>
+          <p:cNvPr id="1001501725" name="Notes Placeholder 2"/>
           <p:cNvSpPr>
             <a:spLocks noGrp="1"/>
           </p:cNvSpPr>
@@ -1173,7 +1173,7 @@
       </p:sp>
       <p:sp>
         <p:nvSpPr>
-          <p:cNvPr id="978889747" name="Slide Number Placeholder 3"/>
+          <p:cNvPr id="2111560881" name="Slide Number Placeholder 3"/>
           <p:cNvSpPr>
             <a:spLocks noGrp="1"/>
           </p:cNvSpPr>
@@ -1224,7 +1224,7 @@
       </p:grpSpPr>
       <p:sp>
         <p:nvSpPr>
-          <p:cNvPr id="2004291769" name="Slide Image Placeholder 1"/>
+          <p:cNvPr id="1697728905" name="Slide Image Placeholder 1"/>
           <p:cNvSpPr>
             <a:spLocks noChangeAspect="1" noGrp="1" noRot="1"/>
           </p:cNvSpPr>
@@ -1236,7 +1236,7 @@
       </p:sp>
       <p:sp>
         <p:nvSpPr>
-          <p:cNvPr id="1303111346" name="Notes Placeholder 2"/>
+          <p:cNvPr id="1610079966" name="Notes Placeholder 2"/>
           <p:cNvSpPr>
             <a:spLocks noGrp="1"/>
           </p:cNvSpPr>
@@ -1258,7 +1258,7 @@
       </p:sp>
       <p:sp>
         <p:nvSpPr>
-          <p:cNvPr id="1926884264" name="Slide Number Placeholder 3"/>
+          <p:cNvPr id="494398181" name="Slide Number Placeholder 3"/>
           <p:cNvSpPr>
             <a:spLocks noGrp="1"/>
           </p:cNvSpPr>
@@ -1309,7 +1309,7 @@
       </p:grpSpPr>
       <p:sp>
         <p:nvSpPr>
-          <p:cNvPr id="1133410437" name="Slide Image Placeholder 1"/>
+          <p:cNvPr id="1990222221" name="Slide Image Placeholder 1"/>
           <p:cNvSpPr>
             <a:spLocks noChangeAspect="1" noGrp="1" noRot="1"/>
           </p:cNvSpPr>
@@ -1321,7 +1321,7 @@
       </p:sp>
       <p:sp>
         <p:nvSpPr>
-          <p:cNvPr id="387362941" name="Notes Placeholder 2"/>
+          <p:cNvPr id="1355534004" name="Notes Placeholder 2"/>
           <p:cNvSpPr>
             <a:spLocks noGrp="1"/>
           </p:cNvSpPr>
@@ -1343,7 +1343,7 @@
       </p:sp>
       <p:sp>
         <p:nvSpPr>
-          <p:cNvPr id="1216160945" name="Slide Number Placeholder 3"/>
+          <p:cNvPr id="97895569" name="Slide Number Placeholder 3"/>
           <p:cNvSpPr>
             <a:spLocks noGrp="1"/>
           </p:cNvSpPr>
@@ -1394,7 +1394,7 @@
       </p:grpSpPr>
       <p:sp>
         <p:nvSpPr>
-          <p:cNvPr id="861221235" name="Title 1"/>
+          <p:cNvPr id="1483083404" name="Title 1"/>
           <p:cNvSpPr>
             <a:spLocks noGrp="1"/>
           </p:cNvSpPr>
@@ -1429,7 +1429,7 @@
       </p:sp>
       <p:sp>
         <p:nvSpPr>
-          <p:cNvPr id="257868224" name="Subtitle 2"/>
+          <p:cNvPr id="1176602528" name="Subtitle 2"/>
           <p:cNvSpPr>
             <a:spLocks noGrp="1"/>
           </p:cNvSpPr>
@@ -1497,7 +1497,7 @@
       </p:sp>
       <p:sp>
         <p:nvSpPr>
-          <p:cNvPr id="904758709" name="Date Placeholder 3"/>
+          <p:cNvPr id="1072023159" name="Date Placeholder 3"/>
           <p:cNvSpPr>
             <a:spLocks noGrp="1"/>
           </p:cNvSpPr>
@@ -1523,7 +1523,7 @@
       </p:sp>
       <p:sp>
         <p:nvSpPr>
-          <p:cNvPr id="1645754201" name="Footer Placeholder 4"/>
+          <p:cNvPr id="1404163798" name="Footer Placeholder 4"/>
           <p:cNvSpPr>
             <a:spLocks noGrp="1"/>
           </p:cNvSpPr>
@@ -1545,7 +1545,7 @@
       </p:sp>
       <p:sp>
         <p:nvSpPr>
-          <p:cNvPr id="871579564" name="Slide Number Placeholder 5"/>
+          <p:cNvPr id="73420462" name="Slide Number Placeholder 5"/>
           <p:cNvSpPr>
             <a:spLocks noGrp="1"/>
           </p:cNvSpPr>
@@ -1596,7 +1596,7 @@
       </p:grpSpPr>
       <p:sp>
         <p:nvSpPr>
-          <p:cNvPr id="1316869327" name="Title 1"/>
+          <p:cNvPr id="157854279" name="Title 1"/>
           <p:cNvSpPr>
             <a:spLocks noGrp="1"/>
           </p:cNvSpPr>
@@ -1622,7 +1622,7 @@
       </p:sp>
       <p:sp>
         <p:nvSpPr>
-          <p:cNvPr id="1340323758" name="Vertical Text Placeholder 2"/>
+          <p:cNvPr id="745172193" name="Vertical Text Placeholder 2"/>
           <p:cNvSpPr>
             <a:spLocks noGrp="1"/>
           </p:cNvSpPr>
@@ -1688,7 +1688,7 @@
       </p:sp>
       <p:sp>
         <p:nvSpPr>
-          <p:cNvPr id="1106391803" name="Date Placeholder 3"/>
+          <p:cNvPr id="876111733" name="Date Placeholder 3"/>
           <p:cNvSpPr>
             <a:spLocks noGrp="1"/>
           </p:cNvSpPr>
@@ -1714,7 +1714,7 @@
       </p:sp>
       <p:sp>
         <p:nvSpPr>
-          <p:cNvPr id="647772146" name="Footer Placeholder 4"/>
+          <p:cNvPr id="2118272806" name="Footer Placeholder 4"/>
           <p:cNvSpPr>
             <a:spLocks noGrp="1"/>
           </p:cNvSpPr>
@@ -1736,7 +1736,7 @@
       </p:sp>
       <p:sp>
         <p:nvSpPr>
-          <p:cNvPr id="112044636" name="Slide Number Placeholder 5"/>
+          <p:cNvPr id="349102710" name="Slide Number Placeholder 5"/>
           <p:cNvSpPr>
             <a:spLocks noGrp="1"/>
           </p:cNvSpPr>
@@ -1787,7 +1787,7 @@
       </p:grpSpPr>
       <p:sp>
         <p:nvSpPr>
-          <p:cNvPr id="1614939651" name="Vertical Title 1"/>
+          <p:cNvPr id="1161897399" name="Vertical Title 1"/>
           <p:cNvSpPr>
             <a:spLocks noGrp="1"/>
           </p:cNvSpPr>
@@ -1818,7 +1818,7 @@
       </p:sp>
       <p:sp>
         <p:nvSpPr>
-          <p:cNvPr id="873851508" name="Vertical Text Placeholder 2"/>
+          <p:cNvPr id="220244893" name="Vertical Text Placeholder 2"/>
           <p:cNvSpPr>
             <a:spLocks noGrp="1"/>
           </p:cNvSpPr>
@@ -1889,7 +1889,7 @@
       </p:sp>
       <p:sp>
         <p:nvSpPr>
-          <p:cNvPr id="145155196" name="Date Placeholder 3"/>
+          <p:cNvPr id="1204130652" name="Date Placeholder 3"/>
           <p:cNvSpPr>
             <a:spLocks noGrp="1"/>
           </p:cNvSpPr>
@@ -1915,7 +1915,7 @@
       </p:sp>
       <p:sp>
         <p:nvSpPr>
-          <p:cNvPr id="1257615290" name="Footer Placeholder 4"/>
+          <p:cNvPr id="409980628" name="Footer Placeholder 4"/>
           <p:cNvSpPr>
             <a:spLocks noGrp="1"/>
           </p:cNvSpPr>
@@ -1937,7 +1937,7 @@
       </p:sp>
       <p:sp>
         <p:nvSpPr>
-          <p:cNvPr id="1780484919" name="Slide Number Placeholder 5"/>
+          <p:cNvPr id="69185502" name="Slide Number Placeholder 5"/>
           <p:cNvSpPr>
             <a:spLocks noGrp="1"/>
           </p:cNvSpPr>
@@ -1988,7 +1988,7 @@
       </p:grpSpPr>
       <p:sp>
         <p:nvSpPr>
-          <p:cNvPr id="754544400" name="Title 1"/>
+          <p:cNvPr id="415634333" name="Title 1"/>
           <p:cNvSpPr>
             <a:spLocks noGrp="1"/>
           </p:cNvSpPr>
@@ -2014,7 +2014,7 @@
       </p:sp>
       <p:sp>
         <p:nvSpPr>
-          <p:cNvPr id="753090453" name="Content Placeholder 2"/>
+          <p:cNvPr id="1067491292" name="Content Placeholder 2"/>
           <p:cNvSpPr>
             <a:spLocks noGrp="1"/>
           </p:cNvSpPr>
@@ -2080,7 +2080,7 @@
       </p:sp>
       <p:sp>
         <p:nvSpPr>
-          <p:cNvPr id="1357119384" name="Date Placeholder 3"/>
+          <p:cNvPr id="1434552712" name="Date Placeholder 3"/>
           <p:cNvSpPr>
             <a:spLocks noGrp="1"/>
           </p:cNvSpPr>
@@ -2106,7 +2106,7 @@
       </p:sp>
       <p:sp>
         <p:nvSpPr>
-          <p:cNvPr id="1672462308" name="Footer Placeholder 4"/>
+          <p:cNvPr id="1436480915" name="Footer Placeholder 4"/>
           <p:cNvSpPr>
             <a:spLocks noGrp="1"/>
           </p:cNvSpPr>
@@ -2128,7 +2128,7 @@
       </p:sp>
       <p:sp>
         <p:nvSpPr>
-          <p:cNvPr id="1274461181" name="Slide Number Placeholder 5"/>
+          <p:cNvPr id="681778233" name="Slide Number Placeholder 5"/>
           <p:cNvSpPr>
             <a:spLocks noGrp="1"/>
           </p:cNvSpPr>
@@ -2179,7 +2179,7 @@
       </p:grpSpPr>
       <p:sp>
         <p:nvSpPr>
-          <p:cNvPr id="432109315" name="Title 1"/>
+          <p:cNvPr id="23739613" name="Title 1"/>
           <p:cNvSpPr>
             <a:spLocks noGrp="1"/>
           </p:cNvSpPr>
@@ -2214,7 +2214,7 @@
       </p:sp>
       <p:sp>
         <p:nvSpPr>
-          <p:cNvPr id="211165901" name="Text Placeholder 2"/>
+          <p:cNvPr id="1537531116" name="Text Placeholder 2"/>
           <p:cNvSpPr>
             <a:spLocks noGrp="1"/>
           </p:cNvSpPr>
@@ -2336,7 +2336,7 @@
       </p:sp>
       <p:sp>
         <p:nvSpPr>
-          <p:cNvPr id="279429128" name="Date Placeholder 3"/>
+          <p:cNvPr id="1440956309" name="Date Placeholder 3"/>
           <p:cNvSpPr>
             <a:spLocks noGrp="1"/>
           </p:cNvSpPr>
@@ -2362,7 +2362,7 @@
       </p:sp>
       <p:sp>
         <p:nvSpPr>
-          <p:cNvPr id="870027223" name="Footer Placeholder 4"/>
+          <p:cNvPr id="203453858" name="Footer Placeholder 4"/>
           <p:cNvSpPr>
             <a:spLocks noGrp="1"/>
           </p:cNvSpPr>
@@ -2384,7 +2384,7 @@
       </p:sp>
       <p:sp>
         <p:nvSpPr>
-          <p:cNvPr id="61937338" name="Slide Number Placeholder 5"/>
+          <p:cNvPr id="588094455" name="Slide Number Placeholder 5"/>
           <p:cNvSpPr>
             <a:spLocks noGrp="1"/>
           </p:cNvSpPr>
@@ -2435,7 +2435,7 @@
       </p:grpSpPr>
       <p:sp>
         <p:nvSpPr>
-          <p:cNvPr id="362201863" name="Title 1"/>
+          <p:cNvPr id="587506098" name="Title 1"/>
           <p:cNvSpPr>
             <a:spLocks noGrp="1"/>
           </p:cNvSpPr>
@@ -2461,7 +2461,7 @@
       </p:sp>
       <p:sp>
         <p:nvSpPr>
-          <p:cNvPr id="1968086400" name="Content Placeholder 2"/>
+          <p:cNvPr id="1410799055" name="Content Placeholder 2"/>
           <p:cNvSpPr>
             <a:spLocks noGrp="1"/>
           </p:cNvSpPr>
@@ -2532,7 +2532,7 @@
       </p:sp>
       <p:sp>
         <p:nvSpPr>
-          <p:cNvPr id="1458759997" name="Content Placeholder 3"/>
+          <p:cNvPr id="1660666200" name="Content Placeholder 3"/>
           <p:cNvSpPr>
             <a:spLocks noGrp="1"/>
           </p:cNvSpPr>
@@ -2603,7 +2603,7 @@
       </p:sp>
       <p:sp>
         <p:nvSpPr>
-          <p:cNvPr id="412061077" name="Date Placeholder 4"/>
+          <p:cNvPr id="1774620144" name="Date Placeholder 4"/>
           <p:cNvSpPr>
             <a:spLocks noGrp="1"/>
           </p:cNvSpPr>
@@ -2629,7 +2629,7 @@
       </p:sp>
       <p:sp>
         <p:nvSpPr>
-          <p:cNvPr id="879246060" name="Footer Placeholder 5"/>
+          <p:cNvPr id="111879150" name="Footer Placeholder 5"/>
           <p:cNvSpPr>
             <a:spLocks noGrp="1"/>
           </p:cNvSpPr>
@@ -2651,7 +2651,7 @@
       </p:sp>
       <p:sp>
         <p:nvSpPr>
-          <p:cNvPr id="1540235073" name="Slide Number Placeholder 6"/>
+          <p:cNvPr id="973448589" name="Slide Number Placeholder 6"/>
           <p:cNvSpPr>
             <a:spLocks noGrp="1"/>
           </p:cNvSpPr>
@@ -2702,7 +2702,7 @@
       </p:grpSpPr>
       <p:sp>
         <p:nvSpPr>
-          <p:cNvPr id="871165574" name="Title 1"/>
+          <p:cNvPr id="193959791" name="Title 1"/>
           <p:cNvSpPr>
             <a:spLocks noGrp="1"/>
           </p:cNvSpPr>
@@ -2733,7 +2733,7 @@
       </p:sp>
       <p:sp>
         <p:nvSpPr>
-          <p:cNvPr id="2023804779" name="Text Placeholder 2"/>
+          <p:cNvPr id="2038245931" name="Text Placeholder 2"/>
           <p:cNvSpPr>
             <a:spLocks noGrp="1"/>
           </p:cNvSpPr>
@@ -2801,7 +2801,7 @@
       </p:sp>
       <p:sp>
         <p:nvSpPr>
-          <p:cNvPr id="1525703797" name="Content Placeholder 3"/>
+          <p:cNvPr id="1227878781" name="Content Placeholder 3"/>
           <p:cNvSpPr>
             <a:spLocks noGrp="1"/>
           </p:cNvSpPr>
@@ -2872,7 +2872,7 @@
       </p:sp>
       <p:sp>
         <p:nvSpPr>
-          <p:cNvPr id="1242814206" name="Text Placeholder 4"/>
+          <p:cNvPr id="984423424" name="Text Placeholder 4"/>
           <p:cNvSpPr>
             <a:spLocks noGrp="1"/>
           </p:cNvSpPr>
@@ -2940,7 +2940,7 @@
       </p:sp>
       <p:sp>
         <p:nvSpPr>
-          <p:cNvPr id="1687454904" name="Content Placeholder 5"/>
+          <p:cNvPr id="151931495" name="Content Placeholder 5"/>
           <p:cNvSpPr>
             <a:spLocks noGrp="1"/>
           </p:cNvSpPr>
@@ -3011,7 +3011,7 @@
       </p:sp>
       <p:sp>
         <p:nvSpPr>
-          <p:cNvPr id="1782269625" name="Date Placeholder 6"/>
+          <p:cNvPr id="1638524434" name="Date Placeholder 6"/>
           <p:cNvSpPr>
             <a:spLocks noGrp="1"/>
           </p:cNvSpPr>
@@ -3037,7 +3037,7 @@
       </p:sp>
       <p:sp>
         <p:nvSpPr>
-          <p:cNvPr id="1236129481" name="Footer Placeholder 7"/>
+          <p:cNvPr id="434163938" name="Footer Placeholder 7"/>
           <p:cNvSpPr>
             <a:spLocks noGrp="1"/>
           </p:cNvSpPr>
@@ -3059,7 +3059,7 @@
       </p:sp>
       <p:sp>
         <p:nvSpPr>
-          <p:cNvPr id="1684349045" name="Slide Number Placeholder 8"/>
+          <p:cNvPr id="747179669" name="Slide Number Placeholder 8"/>
           <p:cNvSpPr>
             <a:spLocks noGrp="1"/>
           </p:cNvSpPr>
@@ -3110,7 +3110,7 @@
       </p:grpSpPr>
       <p:sp>
         <p:nvSpPr>
-          <p:cNvPr id="1540944216" name="Title 1"/>
+          <p:cNvPr id="1462962533" name="Title 1"/>
           <p:cNvSpPr>
             <a:spLocks noGrp="1"/>
           </p:cNvSpPr>
@@ -3136,7 +3136,7 @@
       </p:sp>
       <p:sp>
         <p:nvSpPr>
-          <p:cNvPr id="1870838632" name="Date Placeholder 2"/>
+          <p:cNvPr id="1171159406" name="Date Placeholder 2"/>
           <p:cNvSpPr>
             <a:spLocks noGrp="1"/>
           </p:cNvSpPr>
@@ -3162,7 +3162,7 @@
       </p:sp>
       <p:sp>
         <p:nvSpPr>
-          <p:cNvPr id="460203162" name="Footer Placeholder 3"/>
+          <p:cNvPr id="945966083" name="Footer Placeholder 3"/>
           <p:cNvSpPr>
             <a:spLocks noGrp="1"/>
           </p:cNvSpPr>
@@ -3184,7 +3184,7 @@
       </p:sp>
       <p:sp>
         <p:nvSpPr>
-          <p:cNvPr id="1304229960" name="Slide Number Placeholder 4"/>
+          <p:cNvPr id="1055648776" name="Slide Number Placeholder 4"/>
           <p:cNvSpPr>
             <a:spLocks noGrp="1"/>
           </p:cNvSpPr>
@@ -3235,7 +3235,7 @@
       </p:grpSpPr>
       <p:sp>
         <p:nvSpPr>
-          <p:cNvPr id="881009628" name="Date Placeholder 1"/>
+          <p:cNvPr id="1954031366" name="Date Placeholder 1"/>
           <p:cNvSpPr>
             <a:spLocks noGrp="1"/>
           </p:cNvSpPr>
@@ -3261,7 +3261,7 @@
       </p:sp>
       <p:sp>
         <p:nvSpPr>
-          <p:cNvPr id="1820519561" name="Footer Placeholder 2"/>
+          <p:cNvPr id="975049249" name="Footer Placeholder 2"/>
           <p:cNvSpPr>
             <a:spLocks noGrp="1"/>
           </p:cNvSpPr>
@@ -3283,7 +3283,7 @@
       </p:sp>
       <p:sp>
         <p:nvSpPr>
-          <p:cNvPr id="395029018" name="Slide Number Placeholder 3"/>
+          <p:cNvPr id="1005963970" name="Slide Number Placeholder 3"/>
           <p:cNvSpPr>
             <a:spLocks noGrp="1"/>
           </p:cNvSpPr>
@@ -3334,7 +3334,7 @@
       </p:grpSpPr>
       <p:sp>
         <p:nvSpPr>
-          <p:cNvPr id="318590851" name="Title 1"/>
+          <p:cNvPr id="2122038162" name="Title 1"/>
           <p:cNvSpPr>
             <a:spLocks noGrp="1"/>
           </p:cNvSpPr>
@@ -3369,7 +3369,7 @@
       </p:sp>
       <p:sp>
         <p:nvSpPr>
-          <p:cNvPr id="2021369687" name="Content Placeholder 2"/>
+          <p:cNvPr id="110304805" name="Content Placeholder 2"/>
           <p:cNvSpPr>
             <a:spLocks noGrp="1"/>
           </p:cNvSpPr>
@@ -3468,7 +3468,7 @@
       </p:sp>
       <p:sp>
         <p:nvSpPr>
-          <p:cNvPr id="1793920383" name="Text Placeholder 3"/>
+          <p:cNvPr id="647734884" name="Text Placeholder 3"/>
           <p:cNvSpPr>
             <a:spLocks noGrp="1"/>
           </p:cNvSpPr>
@@ -3536,7 +3536,7 @@
       </p:sp>
       <p:sp>
         <p:nvSpPr>
-          <p:cNvPr id="2031453217" name="Date Placeholder 4"/>
+          <p:cNvPr id="1348411727" name="Date Placeholder 4"/>
           <p:cNvSpPr>
             <a:spLocks noGrp="1"/>
           </p:cNvSpPr>
@@ -3562,7 +3562,7 @@
       </p:sp>
       <p:sp>
         <p:nvSpPr>
-          <p:cNvPr id="2063544750" name="Footer Placeholder 5"/>
+          <p:cNvPr id="1109902426" name="Footer Placeholder 5"/>
           <p:cNvSpPr>
             <a:spLocks noGrp="1"/>
           </p:cNvSpPr>
@@ -3584,7 +3584,7 @@
       </p:sp>
       <p:sp>
         <p:nvSpPr>
-          <p:cNvPr id="323428953" name="Slide Number Placeholder 6"/>
+          <p:cNvPr id="1626788222" name="Slide Number Placeholder 6"/>
           <p:cNvSpPr>
             <a:spLocks noGrp="1"/>
           </p:cNvSpPr>
@@ -3635,7 +3635,7 @@
       </p:grpSpPr>
       <p:sp>
         <p:nvSpPr>
-          <p:cNvPr id="678422818" name="Title 1"/>
+          <p:cNvPr id="988299498" name="Title 1"/>
           <p:cNvSpPr>
             <a:spLocks noGrp="1"/>
           </p:cNvSpPr>
@@ -3670,7 +3670,7 @@
       </p:sp>
       <p:sp>
         <p:nvSpPr>
-          <p:cNvPr id="84879768" name="Picture Placeholder 2"/>
+          <p:cNvPr id="233219488" name="Picture Placeholder 2"/>
           <p:cNvSpPr>
             <a:spLocks noGrp="1"/>
           </p:cNvSpPr>
@@ -3734,7 +3734,7 @@
       </p:sp>
       <p:sp>
         <p:nvSpPr>
-          <p:cNvPr id="1403602027" name="Text Placeholder 3"/>
+          <p:cNvPr id="1079304840" name="Text Placeholder 3"/>
           <p:cNvSpPr>
             <a:spLocks noGrp="1"/>
           </p:cNvSpPr>
@@ -3802,7 +3802,7 @@
       </p:sp>
       <p:sp>
         <p:nvSpPr>
-          <p:cNvPr id="1555521131" name="Date Placeholder 4"/>
+          <p:cNvPr id="1963375746" name="Date Placeholder 4"/>
           <p:cNvSpPr>
             <a:spLocks noGrp="1"/>
           </p:cNvSpPr>
@@ -3828,7 +3828,7 @@
       </p:sp>
       <p:sp>
         <p:nvSpPr>
-          <p:cNvPr id="203235977" name="Footer Placeholder 5"/>
+          <p:cNvPr id="1900791563" name="Footer Placeholder 5"/>
           <p:cNvSpPr>
             <a:spLocks noGrp="1"/>
           </p:cNvSpPr>
@@ -3850,7 +3850,7 @@
       </p:sp>
       <p:sp>
         <p:nvSpPr>
-          <p:cNvPr id="929132659" name="Slide Number Placeholder 6"/>
+          <p:cNvPr id="989615662" name="Slide Number Placeholder 6"/>
           <p:cNvSpPr>
             <a:spLocks noGrp="1"/>
           </p:cNvSpPr>
@@ -3906,7 +3906,7 @@
       </p:grpSpPr>
       <p:sp>
         <p:nvSpPr>
-          <p:cNvPr id="1932201128" name="Title Placeholder 1"/>
+          <p:cNvPr id="970120670" name="Title Placeholder 1"/>
           <p:cNvSpPr>
             <a:spLocks noGrp="1"/>
           </p:cNvSpPr>
@@ -3942,7 +3942,7 @@
       </p:sp>
       <p:sp>
         <p:nvSpPr>
-          <p:cNvPr id="1636593298" name="Text Placeholder 2"/>
+          <p:cNvPr id="1169512291" name="Text Placeholder 2"/>
           <p:cNvSpPr>
             <a:spLocks noGrp="1"/>
           </p:cNvSpPr>
@@ -4018,7 +4018,7 @@
       </p:sp>
       <p:sp>
         <p:nvSpPr>
-          <p:cNvPr id="537789511" name="Date Placeholder 3"/>
+          <p:cNvPr id="2139654727" name="Date Placeholder 3"/>
           <p:cNvSpPr>
             <a:spLocks noGrp="1"/>
           </p:cNvSpPr>
@@ -4062,7 +4062,7 @@
       </p:sp>
       <p:sp>
         <p:nvSpPr>
-          <p:cNvPr id="647230945" name="Footer Placeholder 4"/>
+          <p:cNvPr id="912679914" name="Footer Placeholder 4"/>
           <p:cNvSpPr>
             <a:spLocks noGrp="1"/>
           </p:cNvSpPr>
@@ -4102,7 +4102,7 @@
       </p:sp>
       <p:sp>
         <p:nvSpPr>
-          <p:cNvPr id="564394804" name="Slide Number Placeholder 5"/>
+          <p:cNvPr id="2141906668" name="Slide Number Placeholder 5"/>
           <p:cNvSpPr>
             <a:spLocks noGrp="1"/>
           </p:cNvSpPr>
@@ -4462,7 +4462,7 @@
       </p:grpSpPr>
       <p:sp>
         <p:nvSpPr>
-          <p:cNvPr id="168663237" name="Title 1"/>
+          <p:cNvPr id="465067308" name="Title 1"/>
           <p:cNvSpPr>
             <a:spLocks noGrp="1"/>
           </p:cNvSpPr>
@@ -4488,7 +4488,7 @@
       </p:sp>
       <p:sp>
         <p:nvSpPr>
-          <p:cNvPr id="1316772573" name="Subtitle 2"/>
+          <p:cNvPr id="888954864" name="Subtitle 2"/>
           <p:cNvSpPr>
             <a:spLocks noGrp="1"/>
           </p:cNvSpPr>
@@ -4550,7 +4550,7 @@
       </p:grpSpPr>
       <p:sp>
         <p:nvSpPr>
-          <p:cNvPr id="237088411" name="Text 0"/>
+          <p:cNvPr id="602354527" name="Text 0"/>
           <p:cNvSpPr/>
           <p:nvPr/>
         </p:nvSpPr>
@@ -4596,7 +4596,7 @@
       </p:sp>
       <p:sp>
         <p:nvSpPr>
-          <p:cNvPr id="1514602543" name="Text 1"/>
+          <p:cNvPr id="1700507" name="Text 1"/>
           <p:cNvSpPr/>
           <p:nvPr/>
         </p:nvSpPr>
@@ -4645,7 +4645,7 @@
       </p:sp>
       <p:sp>
         <p:nvSpPr>
-          <p:cNvPr id="1697479261" name="Text 2"/>
+          <p:cNvPr id="1647979622" name="Text 2"/>
           <p:cNvSpPr/>
           <p:nvPr/>
         </p:nvSpPr>
@@ -4717,7 +4717,7 @@
       </p:sp>
       <p:sp>
         <p:nvSpPr>
-          <p:cNvPr id="1641722055" name="Text 3"/>
+          <p:cNvPr id="509471523" name="Text 3"/>
           <p:cNvSpPr/>
           <p:nvPr/>
         </p:nvSpPr>
@@ -4766,13 +4766,13 @@
       </p:sp>
       <p:sp>
         <p:nvSpPr>
-          <p:cNvPr id="1809091555" name="Text 4"/>
+          <p:cNvPr id="409696057" name="Text 4"/>
           <p:cNvSpPr/>
           <p:nvPr/>
         </p:nvSpPr>
         <p:spPr bwMode="auto">
           <a:xfrm>
-            <a:off x="761999" y="3576239"/>
+            <a:off x="761999" y="3576238"/>
             <a:ext cx="10667999" cy="1066799"/>
           </a:xfrm>
           <a:prstGeom prst="rect">
@@ -4838,13 +4838,13 @@
       </p:sp>
       <p:sp>
         <p:nvSpPr>
-          <p:cNvPr id="1226775207" name="Text 5"/>
+          <p:cNvPr id="435043041" name="Text 5"/>
           <p:cNvSpPr/>
           <p:nvPr/>
         </p:nvSpPr>
         <p:spPr bwMode="auto">
           <a:xfrm>
-            <a:off x="761999" y="4795439"/>
+            <a:off x="761999" y="4795438"/>
             <a:ext cx="10667999" cy="665361"/>
           </a:xfrm>
           <a:prstGeom prst="roundRect">
@@ -4871,7 +4871,7 @@
       </p:sp>
       <p:sp>
         <p:nvSpPr>
-          <p:cNvPr id="586641142" name="Text 6"/>
+          <p:cNvPr id="1198792263" name="Text 6"/>
           <p:cNvSpPr/>
           <p:nvPr/>
         </p:nvSpPr>
@@ -4947,7 +4947,7 @@
       </p:grpSpPr>
       <p:sp>
         <p:nvSpPr>
-          <p:cNvPr id="1968670733" name="Title 1"/>
+          <p:cNvPr id="1409051565" name="Title 1"/>
           <p:cNvSpPr>
             <a:spLocks noGrp="1"/>
           </p:cNvSpPr>
@@ -4973,7 +4973,7 @@
       </p:sp>
       <p:graphicFrame>
         <p:nvGraphicFramePr>
-          <p:cNvPr id="1192523106" name=""/>
+          <p:cNvPr id="191821657" name=""/>
           <p:cNvGraphicFramePr>
             <a:graphicFrameLocks xmlns:a="http://schemas.openxmlformats.org/drawingml/2006/main"/>
           </p:cNvGraphicFramePr>
@@ -4982,8 +4982,8 @@
           </p:nvPr>
         </p:nvGraphicFramePr>
         <p:xfrm rot="0">
-          <a:off x="838198" y="1825624"/>
-          <a:ext cx="10515600" cy="269217"/>
+          <a:off x="838197" y="1562552"/>
+          <a:ext cx="10439736" cy="4748339"/>
         </p:xfrm>
         <a:graphic>
           <a:graphicData uri="http://schemas.openxmlformats.org/drawingml/2006/table">
@@ -4993,10 +4993,10 @@
               </a:tblPr>
               <a:tblGrid>
                 <a:gridCol w="2085408"/>
-                <a:gridCol w="2085408"/>
-                <a:gridCol w="2039184"/>
-                <a:gridCol w="1799996"/>
-                <a:gridCol w="2417041"/>
+                <a:gridCol w="1604592"/>
+                <a:gridCol w="2430000"/>
+                <a:gridCol w="1710000"/>
+                <a:gridCol w="2597036"/>
               </a:tblGrid>
               <a:tr h="642700">
                 <a:tc>
@@ -5317,7 +5317,7 @@
                           <a:ea typeface="Arial"/>
                           <a:cs typeface="Arial"/>
                         </a:rPr>
-                        <a:t>Kernels and bootloaders, reliable</a:t>
+                        <a:t>Kernels and bootloaders</a:t>
                       </a:r>
                       <a:endParaRPr sz="1800" b="0" i="0" u="none" strike="noStrike" cap="none" spc="0">
                         <a:solidFill>
@@ -5332,7 +5332,7 @@
                   <a:tcPr/>
                 </a:tc>
               </a:tr>
-              <a:tr h="892540">
+              <a:tr h="619920">
                 <a:tc>
                   <a:txBody>
                     <a:bodyPr/>
@@ -5603,7 +5603,307 @@
                           <a:ea typeface="Arial"/>
                           <a:cs typeface="Arial"/>
                         </a:rPr>
-                        <a:t>Standard in kernels on Linux/Unix systems, embeded systems</a:t>
+                        <a:t>Standard in kernels on Linux/Unix systems</a:t>
+                      </a:r>
+                      <a:endParaRPr sz="1800" b="0" i="0" u="none" strike="noStrike" cap="none" spc="0">
+                        <a:solidFill>
+                          <a:schemeClr val="tx1"/>
+                        </a:solidFill>
+                        <a:latin typeface="Calibri"/>
+                        <a:ea typeface="Arial"/>
+                        <a:cs typeface="Arial"/>
+                      </a:endParaRPr>
+                    </a:p>
+                  </a:txBody>
+                  <a:tcPr/>
+                </a:tc>
+              </a:tr>
+              <a:tr h="365760">
+                <a:tc>
+                  <a:txBody>
+                    <a:bodyPr/>
+                    <a:p>
+                      <a:pPr>
+                        <a:defRPr/>
+                      </a:pPr>
+                      <a:r>
+                        <a:rPr lang="pt-BR" sz="1600" b="1" i="0" u="none" strike="noStrike" cap="none" spc="0">
+                          <a:solidFill>
+                            <a:schemeClr val="tx1"/>
+                          </a:solidFill>
+                          <a:latin typeface="Calibri"/>
+                          <a:ea typeface="Calibri"/>
+                          <a:cs typeface="Calibri"/>
+                        </a:rPr>
+                        <a:t>GAS (ARM)</a:t>
+                      </a:r>
+                      <a:endParaRPr lang="pt-BR" sz="1600" b="1" i="0" u="none" strike="noStrike" cap="none" spc="0">
+                        <a:solidFill>
+                          <a:schemeClr val="tx1"/>
+                        </a:solidFill>
+                        <a:latin typeface="Calibri"/>
+                        <a:ea typeface="Calibri"/>
+                        <a:cs typeface="Calibri"/>
+                      </a:endParaRPr>
+                    </a:p>
+                  </a:txBody>
+                  <a:tcPr/>
+                </a:tc>
+                <a:tc>
+                  <a:txBody>
+                    <a:bodyPr/>
+                    <a:p>
+                      <a:pPr>
+                        <a:defRPr/>
+                      </a:pPr>
+                      <a:r>
+                        <a:rPr lang="pt-BR"/>
+                        <a:t>ARM</a:t>
+                      </a:r>
+                      <a:endParaRPr lang="en-GB"/>
+                    </a:p>
+                  </a:txBody>
+                  <a:tcPr/>
+                </a:tc>
+                <a:tc>
+                  <a:txBody>
+                    <a:bodyPr/>
+                    <a:p>
+                      <a:pPr>
+                        <a:defRPr/>
+                      </a:pPr>
+                      <a:r>
+                        <a:rPr lang="pt-BR" sz="1800" b="0" i="0" u="none" strike="noStrike" cap="none" spc="0">
+                          <a:solidFill>
+                            <a:schemeClr val="tx1"/>
+                          </a:solidFill>
+                          <a:latin typeface="Calibri"/>
+                          <a:ea typeface="Calibri"/>
+                          <a:cs typeface="Calibri"/>
+                        </a:rPr>
+                        <a:t>ARM32/ARM64</a:t>
+                      </a:r>
+                      <a:endParaRPr lang="en-GB" sz="1800" b="0" i="0" u="none" strike="noStrike" cap="none" spc="0">
+                        <a:solidFill>
+                          <a:schemeClr val="tx1"/>
+                        </a:solidFill>
+                        <a:latin typeface="Calibri"/>
+                        <a:ea typeface="Calibri"/>
+                        <a:cs typeface="Calibri"/>
+                      </a:endParaRPr>
+                    </a:p>
+                  </a:txBody>
+                  <a:tcPr/>
+                </a:tc>
+                <a:tc>
+                  <a:txBody>
+                    <a:bodyPr/>
+                    <a:p>
+                      <a:pPr>
+                        <a:defRPr/>
+                      </a:pPr>
+                      <a:r>
+                        <a:rPr lang="pt-BR" sz="1800" b="0" i="0" u="none" strike="noStrike" cap="none" spc="0">
+                          <a:solidFill>
+                            <a:schemeClr val="dk1"/>
+                          </a:solidFill>
+                          <a:latin typeface="Calibri"/>
+                          <a:ea typeface="Calibri"/>
+                          <a:cs typeface="Calibri"/>
+                        </a:rPr>
+                        <a:t>Linux/Android</a:t>
+                      </a:r>
+                      <a:endParaRPr lang="en-GB" sz="1800" b="0" i="0" u="none" strike="noStrike" cap="none" spc="0">
+                        <a:solidFill>
+                          <a:schemeClr val="dk1"/>
+                        </a:solidFill>
+                        <a:latin typeface="Calibri"/>
+                        <a:ea typeface="Calibri"/>
+                        <a:cs typeface="Calibri"/>
+                      </a:endParaRPr>
+                    </a:p>
+                  </a:txBody>
+                  <a:tcPr/>
+                </a:tc>
+                <a:tc>
+                  <a:txBody>
+                    <a:bodyPr/>
+                    <a:p>
+                      <a:pPr>
+                        <a:defRPr/>
+                      </a:pPr>
+                      <a:r>
+                        <a:rPr lang="pt-BR" sz="1800" b="0" i="0" u="none" strike="noStrike" cap="none" spc="0">
+                          <a:solidFill>
+                            <a:schemeClr val="tx1"/>
+                          </a:solidFill>
+                          <a:latin typeface="Calibri"/>
+                          <a:ea typeface="Calibri"/>
+                          <a:cs typeface="Calibri"/>
+                        </a:rPr>
+                        <a:t>Sistemas Linux de ARM</a:t>
+                      </a:r>
+                      <a:endParaRPr lang="pt-BR" sz="1800" b="0" i="0" u="none" strike="noStrike" cap="none" spc="0">
+                        <a:solidFill>
+                          <a:schemeClr val="tx1"/>
+                        </a:solidFill>
+                        <a:latin typeface="Calibri"/>
+                        <a:ea typeface="Calibri"/>
+                        <a:cs typeface="Calibri"/>
+                      </a:endParaRPr>
+                    </a:p>
+                    <a:p>
+                      <a:pPr>
+                        <a:defRPr/>
+                      </a:pPr>
+                      <a:r>
+                        <a:rPr lang="pt-BR" sz="1800" b="0" i="0" u="none" strike="noStrike" cap="none" spc="0">
+                          <a:solidFill>
+                            <a:schemeClr val="tx1"/>
+                          </a:solidFill>
+                          <a:latin typeface="Calibri"/>
+                          <a:ea typeface="Calibri"/>
+                          <a:cs typeface="Calibri"/>
+                        </a:rPr>
+                        <a:t> e Android</a:t>
+                      </a:r>
+                      <a:endParaRPr lang="pt-BR" sz="1800" b="0" i="0" u="none" strike="noStrike" cap="none" spc="0">
+                        <a:solidFill>
+                          <a:schemeClr val="tx1"/>
+                        </a:solidFill>
+                        <a:latin typeface="Calibri"/>
+                        <a:ea typeface="Arial"/>
+                        <a:cs typeface="Arial"/>
+                      </a:endParaRPr>
+                    </a:p>
+                  </a:txBody>
+                  <a:tcPr/>
+                </a:tc>
+              </a:tr>
+              <a:tr h="365760">
+                <a:tc>
+                  <a:txBody>
+                    <a:bodyPr/>
+                    <a:p>
+                      <a:pPr>
+                        <a:defRPr/>
+                      </a:pPr>
+                      <a:r>
+                        <a:rPr lang="pt-BR" sz="1600" b="1" i="0" u="none" strike="noStrike" cap="none" spc="0">
+                          <a:solidFill>
+                            <a:schemeClr val="tx1"/>
+                          </a:solidFill>
+                          <a:latin typeface="Calibri"/>
+                          <a:ea typeface="Calibri"/>
+                          <a:cs typeface="Calibri"/>
+                        </a:rPr>
+                        <a:t>ARMASM</a:t>
+                      </a:r>
+                      <a:endParaRPr sz="1600" b="1" i="0" u="none" strike="noStrike" cap="none" spc="0">
+                        <a:solidFill>
+                          <a:schemeClr val="tx1"/>
+                        </a:solidFill>
+                        <a:latin typeface="Calibri"/>
+                        <a:ea typeface="Arial"/>
+                        <a:cs typeface="Arial"/>
+                      </a:endParaRPr>
+                    </a:p>
+                  </a:txBody>
+                  <a:tcPr/>
+                </a:tc>
+                <a:tc>
+                  <a:txBody>
+                    <a:bodyPr/>
+                    <a:p>
+                      <a:pPr>
+                        <a:defRPr/>
+                      </a:pPr>
+                      <a:r>
+                        <a:rPr lang="en-GB" sz="1800" b="0" i="0" u="none" strike="noStrike" cap="none" spc="0">
+                          <a:solidFill>
+                            <a:schemeClr val="dk1"/>
+                          </a:solidFill>
+                          <a:latin typeface="Calibri"/>
+                          <a:ea typeface="Calibri"/>
+                          <a:cs typeface="Calibri"/>
+                        </a:rPr>
+                        <a:t>ARM</a:t>
+                      </a:r>
+                      <a:endParaRPr lang="en-GB"/>
+                    </a:p>
+                  </a:txBody>
+                  <a:tcPr/>
+                </a:tc>
+                <a:tc>
+                  <a:txBody>
+                    <a:bodyPr/>
+                    <a:p>
+                      <a:pPr>
+                        <a:defRPr/>
+                      </a:pPr>
+                      <a:r>
+                        <a:rPr lang="pt-BR" sz="1800" b="0" i="0" u="none" strike="noStrike" cap="none" spc="0">
+                          <a:solidFill>
+                            <a:schemeClr val="tx1"/>
+                          </a:solidFill>
+                          <a:latin typeface="Calibri"/>
+                          <a:ea typeface="Calibri"/>
+                          <a:cs typeface="Calibri"/>
+                        </a:rPr>
+                        <a:t>ARM32/ARM64</a:t>
+                      </a:r>
+                      <a:endParaRPr sz="1800" b="0" i="0" u="none" strike="noStrike" cap="none" spc="0">
+                        <a:solidFill>
+                          <a:schemeClr val="tx1"/>
+                        </a:solidFill>
+                        <a:latin typeface="Calibri"/>
+                        <a:ea typeface="Calibri"/>
+                        <a:cs typeface="Calibri"/>
+                      </a:endParaRPr>
+                    </a:p>
+                  </a:txBody>
+                  <a:tcPr/>
+                </a:tc>
+                <a:tc>
+                  <a:txBody>
+                    <a:bodyPr/>
+                    <a:p>
+                      <a:pPr>
+                        <a:defRPr/>
+                      </a:pPr>
+                      <a:r>
+                        <a:rPr lang="en-GB" sz="1800" b="0" i="0" u="none" strike="noStrike" cap="none" spc="0">
+                          <a:solidFill>
+                            <a:schemeClr val="dk1"/>
+                          </a:solidFill>
+                          <a:latin typeface="Calibri"/>
+                          <a:ea typeface="Calibri"/>
+                          <a:cs typeface="Calibri"/>
+                        </a:rPr>
+                        <a:t>Windows, Linux</a:t>
+                      </a:r>
+                      <a:endParaRPr lang="en-GB"/>
+                    </a:p>
+                  </a:txBody>
+                  <a:tcPr/>
+                </a:tc>
+                <a:tc>
+                  <a:txBody>
+                    <a:bodyPr/>
+                    <a:p>
+                      <a:pPr>
+                        <a:defRPr/>
+                      </a:pPr>
+                      <a:r>
+                        <a:rPr lang="pt-BR" sz="1800" b="0" i="0" u="none" strike="noStrike" cap="none" spc="0">
+                          <a:solidFill>
+                            <a:schemeClr val="tx1"/>
+                          </a:solidFill>
+                          <a:latin typeface="Calibri"/>
+                          <a:ea typeface="Arial"/>
+                          <a:cs typeface="Arial"/>
+                        </a:rPr>
+                        <a:t>Embedded Systems</a:t>
                       </a:r>
                       <a:endParaRPr sz="1800" b="0" i="0" u="none" strike="noStrike" cap="none" spc="0">
                         <a:solidFill>
@@ -5635,29 +5935,7 @@
                           <a:ea typeface="Calibri"/>
                           <a:cs typeface="Calibri"/>
                         </a:rPr>
-                        <a:t>FASM (Flat</a:t>
-                      </a:r>
-                      <a:r>
-                        <a:rPr lang="pt-BR" sz="1600" b="1" i="0" u="none" strike="noStrike" cap="none" spc="0">
-                          <a:solidFill>
-                            <a:schemeClr val="tx1"/>
-                          </a:solidFill>
-                          <a:latin typeface="Calibri"/>
-                          <a:ea typeface="Calibri"/>
-                          <a:cs typeface="Calibri"/>
-                        </a:rPr>
-                        <a:t> </a:t>
-                      </a:r>
-                      <a:r>
-                        <a:rPr lang="en-GB" sz="1600" b="1" i="0" u="none" strike="noStrike" cap="none" spc="0">
-                          <a:solidFill>
-                            <a:schemeClr val="tx1"/>
-                          </a:solidFill>
-                          <a:latin typeface="Calibri"/>
-                          <a:ea typeface="Calibri"/>
-                          <a:cs typeface="Calibri"/>
-                        </a:rPr>
-                        <a:t>Assembler) </a:t>
+                        <a:t>LLVM / Clang ASM</a:t>
                       </a:r>
                       <a:endParaRPr sz="1600" b="1" i="0" u="none" strike="noStrike" cap="none" spc="0">
                         <a:solidFill>
@@ -5679,8 +5957,8 @@
                         <a:defRPr/>
                       </a:pPr>
                       <a:r>
-                        <a:rPr lang="en-GB"/>
-                        <a:t>Intel</a:t>
+                        <a:rPr lang="pt-BR"/>
+                        <a:t>ARM</a:t>
                       </a:r>
                       <a:endParaRPr lang="en-GB"/>
                     </a:p>
@@ -5695,7 +5973,7 @@
                         <a:defRPr/>
                       </a:pPr>
                       <a:r>
-                        <a:rPr lang="en-GB" sz="1800" b="0" i="0" u="none" strike="noStrike" cap="none" spc="0">
+                        <a:rPr lang="pt-BR" sz="1800" b="0" i="0" u="none" strike="noStrike" cap="none" spc="0">
                           <a:solidFill>
                             <a:schemeClr val="tx1"/>
                           </a:solidFill>
@@ -5703,7 +5981,7 @@
                           <a:ea typeface="Calibri"/>
                           <a:cs typeface="Calibri"/>
                         </a:rPr>
-                        <a:t>16, 32, 64 bits</a:t>
+                        <a:t>ARM64</a:t>
                       </a:r>
                       <a:endParaRPr lang="en-GB" sz="1800" b="0" i="0" u="none" strike="noStrike" cap="none" spc="0">
                         <a:solidFill>
@@ -5733,7 +6011,51 @@
                           <a:ea typeface="Calibri"/>
                           <a:cs typeface="Calibri"/>
                         </a:rPr>
-                        <a:t>Windows, Linux, DOS,</a:t>
+                        <a:t>Linux, </a:t>
+                      </a:r>
+                      <a:r>
+                        <a:rPr lang="pt-BR" sz="1800" b="0" i="0" u="none" strike="noStrike" cap="none" spc="0">
+                          <a:solidFill>
+                            <a:schemeClr val="dk1"/>
+                          </a:solidFill>
+                          <a:latin typeface="Calibri"/>
+                          <a:ea typeface="Calibri"/>
+                          <a:cs typeface="Calibri"/>
+                        </a:rPr>
+                        <a:t>Android</a:t>
+                      </a:r>
+                      <a:r>
+                        <a:rPr lang="en-GB" sz="1800" b="0" i="0" u="none" strike="noStrike" cap="none" spc="0">
+                          <a:solidFill>
+                            <a:schemeClr val="dk1"/>
+                          </a:solidFill>
+                          <a:latin typeface="Calibri"/>
+                          <a:ea typeface="Calibri"/>
+                          <a:cs typeface="Calibri"/>
+                        </a:rPr>
+                        <a:t>, </a:t>
+                      </a:r>
+                      <a:r>
+                        <a:rPr lang="pt-BR" sz="1800" b="0" i="0" u="none" strike="noStrike" cap="none" spc="0">
+                          <a:solidFill>
+                            <a:schemeClr val="dk1"/>
+                          </a:solidFill>
+                          <a:latin typeface="Calibri"/>
+                          <a:ea typeface="Calibri"/>
+                          <a:cs typeface="Calibri"/>
+                        </a:rPr>
+                        <a:t>i</a:t>
+                      </a:r>
+                      <a:r>
+                        <a:rPr lang="en-GB" sz="1800" b="0" i="0" u="none" strike="noStrike" cap="none" spc="0">
+                          <a:solidFill>
+                            <a:schemeClr val="dk1"/>
+                          </a:solidFill>
+                          <a:latin typeface="Calibri"/>
+                          <a:ea typeface="Calibri"/>
+                          <a:cs typeface="Calibri"/>
+                        </a:rPr>
+                        <a:t>OS</a:t>
                       </a:r>
                       <a:endParaRPr lang="en-GB"/>
                     </a:p>
@@ -5756,142 +6078,7 @@
                           <a:ea typeface="Arial"/>
                           <a:cs typeface="Arial"/>
                         </a:rPr>
-                        <a:t>Fast, self-hosting</a:t>
-                      </a:r>
-                      <a:endParaRPr sz="1800" b="0" i="0" u="none" strike="noStrike" cap="none" spc="0">
-                        <a:solidFill>
-                          <a:schemeClr val="tx1"/>
-                        </a:solidFill>
-                        <a:latin typeface="Calibri"/>
-                        <a:ea typeface="Arial"/>
-                        <a:cs typeface="Arial"/>
-                      </a:endParaRPr>
-                    </a:p>
-                  </a:txBody>
-                  <a:tcPr/>
-                </a:tc>
-              </a:tr>
-              <a:tr h="365760">
-                <a:tc>
-                  <a:txBody>
-                    <a:bodyPr/>
-                    <a:p>
-                      <a:pPr>
-                        <a:defRPr/>
-                      </a:pPr>
-                      <a:r>
-                        <a:rPr lang="en-GB" sz="1600" b="1" i="0" u="none" strike="noStrike" cap="none" spc="0">
-                          <a:solidFill>
-                            <a:schemeClr val="tx1"/>
-                          </a:solidFill>
-                          <a:latin typeface="Calibri"/>
-                          <a:ea typeface="Calibri"/>
-                          <a:cs typeface="Calibri"/>
-                        </a:rPr>
-                        <a:t>YASM</a:t>
-                      </a:r>
-                      <a:endParaRPr sz="1600" b="1" i="0" u="none" strike="noStrike" cap="none" spc="0">
-                        <a:solidFill>
-                          <a:schemeClr val="tx1"/>
-                        </a:solidFill>
-                        <a:latin typeface="Calibri"/>
-                        <a:ea typeface="Arial"/>
-                        <a:cs typeface="Arial"/>
-                      </a:endParaRPr>
-                    </a:p>
-                  </a:txBody>
-                  <a:tcPr/>
-                </a:tc>
-                <a:tc>
-                  <a:txBody>
-                    <a:bodyPr/>
-                    <a:p>
-                      <a:pPr>
-                        <a:defRPr/>
-                      </a:pPr>
-                      <a:r>
-                        <a:rPr lang="en-GB"/>
-                        <a:t>AT&amp;T</a:t>
-                      </a:r>
-                      <a:r>
-                        <a:rPr lang="pt-BR"/>
-                        <a:t>, Intel</a:t>
-                      </a:r>
-                      <a:endParaRPr lang="en-GB"/>
-                    </a:p>
-                  </a:txBody>
-                  <a:tcPr/>
-                </a:tc>
-                <a:tc>
-                  <a:txBody>
-                    <a:bodyPr/>
-                    <a:p>
-                      <a:pPr>
-                        <a:defRPr/>
-                      </a:pPr>
-                      <a:r>
-                        <a:rPr lang="en-GB" sz="1800" b="0" i="0" u="none" strike="noStrike" cap="none" spc="0">
-                          <a:solidFill>
-                            <a:schemeClr val="tx1"/>
-                          </a:solidFill>
-                          <a:latin typeface="Calibri"/>
-                          <a:ea typeface="Calibri"/>
-                          <a:cs typeface="Calibri"/>
-                        </a:rPr>
-                        <a:t>16, 32, 64 bits</a:t>
-                      </a:r>
-                      <a:endParaRPr lang="en-GB" sz="1800" b="0" i="0" u="none" strike="noStrike" cap="none" spc="0">
-                        <a:solidFill>
-                          <a:schemeClr val="tx1"/>
-                        </a:solidFill>
-                        <a:latin typeface="Calibri"/>
-                        <a:ea typeface="Arial"/>
-                        <a:cs typeface="Arial"/>
-                      </a:endParaRPr>
-                    </a:p>
-                  </a:txBody>
-                  <a:tcPr/>
-                </a:tc>
-                <a:tc>
-                  <a:txBody>
-                    <a:bodyPr/>
-                    <a:p>
-                      <a:pPr>
-                        <a:defRPr/>
-                      </a:pPr>
-                      <a:r>
-                        <a:rPr lang="en-GB" sz="1800" b="0" i="0" u="none" strike="noStrike" cap="none" spc="0">
-                          <a:solidFill>
-                            <a:schemeClr val="dk1"/>
-                          </a:solidFill>
-                          <a:latin typeface="Calibri"/>
-                          <a:ea typeface="Calibri"/>
-                          <a:cs typeface="Calibri"/>
-                        </a:rPr>
-                        <a:t>Linux, Windows, macOS</a:t>
-                      </a:r>
-                      <a:endParaRPr lang="en-GB"/>
-                    </a:p>
-                  </a:txBody>
-                  <a:tcPr/>
-                </a:tc>
-                <a:tc>
-                  <a:txBody>
-                    <a:bodyPr/>
-                    <a:p>
-                      <a:pPr>
-                        <a:defRPr/>
-                      </a:pPr>
-                      <a:r>
-                        <a:rPr lang="pt-BR" sz="1800" b="0" i="0" u="none" strike="noStrike" cap="none" spc="0">
-                          <a:solidFill>
-                            <a:schemeClr val="tx1"/>
-                          </a:solidFill>
-                          <a:latin typeface="Calibri"/>
-                          <a:ea typeface="Arial"/>
-                          <a:cs typeface="Arial"/>
-                        </a:rPr>
-                        <a:t>NASM + new features, good for cross-platform</a:t>
+                        <a:t>Modern Mobile and Apple</a:t>
                       </a:r>
                       <a:endParaRPr sz="1800" b="0" i="0" u="none" strike="noStrike" cap="none" spc="0">
                         <a:solidFill>
@@ -5945,7 +6132,7 @@
       </p:grpSpPr>
       <p:sp>
         <p:nvSpPr>
-          <p:cNvPr id="1008639317" name="Title 1"/>
+          <p:cNvPr id="507440990" name="Title 1"/>
           <p:cNvSpPr>
             <a:spLocks noGrp="1"/>
           </p:cNvSpPr>
@@ -5967,7 +6154,7 @@
       </p:sp>
       <p:sp>
         <p:nvSpPr>
-          <p:cNvPr id="328815111" name="Content Placeholder 2"/>
+          <p:cNvPr id="1808326157" name="Content Placeholder 2"/>
           <p:cNvSpPr>
             <a:spLocks noGrp="1"/>
           </p:cNvSpPr>
@@ -6022,7 +6209,7 @@
       </p:grpSpPr>
       <p:sp>
         <p:nvSpPr>
-          <p:cNvPr id="1224131181" name="Title 1"/>
+          <p:cNvPr id="292048511" name="Title 1"/>
           <p:cNvSpPr>
             <a:spLocks noGrp="1"/>
           </p:cNvSpPr>
@@ -6044,7 +6231,7 @@
       </p:sp>
       <p:sp>
         <p:nvSpPr>
-          <p:cNvPr id="2048109764" name="Content Placeholder 2"/>
+          <p:cNvPr id="637492177" name="Content Placeholder 2"/>
           <p:cNvSpPr>
             <a:spLocks noGrp="1"/>
           </p:cNvSpPr>
@@ -6099,7 +6286,7 @@
       </p:grpSpPr>
       <p:sp>
         <p:nvSpPr>
-          <p:cNvPr id="364952867" name="Title 1"/>
+          <p:cNvPr id="1366824623" name="Title 1"/>
           <p:cNvSpPr>
             <a:spLocks noGrp="1"/>
           </p:cNvSpPr>
@@ -6121,7 +6308,7 @@
       </p:sp>
       <p:graphicFrame>
         <p:nvGraphicFramePr>
-          <p:cNvPr id="728032314" name="Content Placeholder 3"/>
+          <p:cNvPr id="1133692192" name="Content Placeholder 3"/>
           <p:cNvGraphicFramePr>
             <a:graphicFrameLocks xmlns:a="http://schemas.openxmlformats.org/drawingml/2006/main" noGrp="1"/>
           </p:cNvGraphicFramePr>
@@ -6452,7 +6639,7 @@
       </p:grpSpPr>
       <p:sp>
         <p:nvSpPr>
-          <p:cNvPr id="1423222406" name="Title 1"/>
+          <p:cNvPr id="164308764" name="Title 1"/>
           <p:cNvSpPr>
             <a:spLocks noGrp="1"/>
           </p:cNvSpPr>
@@ -6474,7 +6661,7 @@
       </p:sp>
       <p:graphicFrame>
         <p:nvGraphicFramePr>
-          <p:cNvPr id="1441637937" name="Content Placeholder 3"/>
+          <p:cNvPr id="1965224190" name="Content Placeholder 3"/>
           <p:cNvGraphicFramePr>
             <a:graphicFrameLocks xmlns:a="http://schemas.openxmlformats.org/drawingml/2006/main" noGrp="1"/>
           </p:cNvGraphicFramePr>
@@ -7103,7 +7290,7 @@
       </p:grpSpPr>
       <p:sp>
         <p:nvSpPr>
-          <p:cNvPr id="657114516" name="Text 0"/>
+          <p:cNvPr id="84066178" name="Text 0"/>
           <p:cNvSpPr/>
           <p:nvPr/>
         </p:nvSpPr>
@@ -7149,7 +7336,7 @@
       </p:sp>
       <p:sp>
         <p:nvSpPr>
-          <p:cNvPr id="894401745" name="Text 1"/>
+          <p:cNvPr id="1894868405" name="Text 1"/>
           <p:cNvSpPr/>
           <p:nvPr/>
         </p:nvSpPr>
@@ -7198,7 +7385,7 @@
       </p:sp>
       <p:sp>
         <p:nvSpPr>
-          <p:cNvPr id="1776598905" name="Text 2"/>
+          <p:cNvPr id="1843995578" name="Text 2"/>
           <p:cNvSpPr/>
           <p:nvPr/>
         </p:nvSpPr>
@@ -7295,7 +7482,7 @@
       </p:sp>
       <p:sp>
         <p:nvSpPr>
-          <p:cNvPr id="1873728305" name="Text 3"/>
+          <p:cNvPr id="1198050845" name="Text 3"/>
           <p:cNvSpPr/>
           <p:nvPr/>
         </p:nvSpPr>
@@ -7344,7 +7531,7 @@
       </p:sp>
       <p:sp>
         <p:nvSpPr>
-          <p:cNvPr id="595036133" name="Text 4"/>
+          <p:cNvPr id="563706231" name="Text 4"/>
           <p:cNvSpPr/>
           <p:nvPr/>
         </p:nvSpPr>
@@ -7441,7 +7628,7 @@
       </p:sp>
       <p:sp>
         <p:nvSpPr>
-          <p:cNvPr id="35123317" name="Text 5"/>
+          <p:cNvPr id="1104059195" name="Text 5"/>
           <p:cNvSpPr/>
           <p:nvPr/>
         </p:nvSpPr>
@@ -7474,7 +7661,7 @@
       </p:sp>
       <p:sp>
         <p:nvSpPr>
-          <p:cNvPr id="1103830953" name="Text 6"/>
+          <p:cNvPr id="1126850861" name="Text 6"/>
           <p:cNvSpPr/>
           <p:nvPr/>
         </p:nvSpPr>
@@ -7557,7 +7744,7 @@
       </p:grpSpPr>
       <p:sp>
         <p:nvSpPr>
-          <p:cNvPr id="1175361266" name="Text 0"/>
+          <p:cNvPr id="402439186" name="Text 0"/>
           <p:cNvSpPr/>
           <p:nvPr/>
         </p:nvSpPr>
@@ -7603,7 +7790,7 @@
       </p:sp>
       <p:sp>
         <p:nvSpPr>
-          <p:cNvPr id="1892468088" name="Text 1"/>
+          <p:cNvPr id="2104141427" name="Text 1"/>
           <p:cNvSpPr/>
           <p:nvPr/>
         </p:nvSpPr>
@@ -7652,7 +7839,7 @@
       </p:sp>
       <p:sp>
         <p:nvSpPr>
-          <p:cNvPr id="1520901512" name="Text 2"/>
+          <p:cNvPr id="1022955165" name="Text 2"/>
           <p:cNvSpPr/>
           <p:nvPr/>
         </p:nvSpPr>
@@ -7814,7 +8001,7 @@
       </p:sp>
       <p:sp>
         <p:nvSpPr>
-          <p:cNvPr id="739380826" name="Text 3"/>
+          <p:cNvPr id="839205234" name="Text 3"/>
           <p:cNvSpPr/>
           <p:nvPr/>
         </p:nvSpPr>
@@ -7847,13 +8034,13 @@
       </p:sp>
       <p:sp>
         <p:nvSpPr>
-          <p:cNvPr id="2106612144" name="Text 4"/>
+          <p:cNvPr id="41192611" name="Text 4"/>
           <p:cNvSpPr/>
           <p:nvPr/>
         </p:nvSpPr>
         <p:spPr bwMode="auto">
           <a:xfrm>
-            <a:off x="952499" y="4353519"/>
+            <a:off x="937257" y="4353518"/>
             <a:ext cx="10492740" cy="284361"/>
           </a:xfrm>
           <a:prstGeom prst="rect">
@@ -7868,13 +8055,13 @@
           <a:p>
             <a:pPr marL="0" indent="0" algn="l">
               <a:lnSpc>
-                <a:spcPts val="1679"/>
+                <a:spcPts val="1678"/>
               </a:lnSpc>
               <a:buNone/>
               <a:defRPr/>
             </a:pPr>
             <a:r>
-              <a:rPr lang="en-US" sz="1200">
+              <a:rPr lang="en-US" sz="1200" b="0" i="0" u="none" strike="noStrike" cap="none" spc="0">
                 <a:solidFill>
                   <a:srgbClr val="FFFFFF"/>
                 </a:solidFill>
@@ -7882,9 +8069,9 @@
                 <a:ea typeface="Arial"/>
                 <a:cs typeface="Arial"/>
               </a:rPr>
-              <a:t>MASM e GAS em sistemas críticos certificados</a:t>
-            </a:r>
-            <a:endParaRPr lang="en-US" sz="1200"/>
+              <a:t>ARM AS domina este sector</a:t>
+            </a:r>
+            <a:endParaRPr sz="1200"/>
           </a:p>
         </p:txBody>
       </p:sp>
@@ -7930,7 +8117,7 @@
       </p:grpSpPr>
       <p:sp>
         <p:nvSpPr>
-          <p:cNvPr id="1460514657" name="Text 0"/>
+          <p:cNvPr id="2133478256" name="Text 0"/>
           <p:cNvSpPr/>
           <p:nvPr/>
         </p:nvSpPr>
@@ -7976,7 +8163,7 @@
       </p:sp>
       <p:sp>
         <p:nvSpPr>
-          <p:cNvPr id="1188308519" name="Text 1"/>
+          <p:cNvPr id="780206985" name="Text 1"/>
           <p:cNvSpPr/>
           <p:nvPr/>
         </p:nvSpPr>
@@ -8025,7 +8212,7 @@
       </p:sp>
       <p:sp>
         <p:nvSpPr>
-          <p:cNvPr id="1322362774" name="Text 2"/>
+          <p:cNvPr id="98361719" name="Text 2"/>
           <p:cNvSpPr/>
           <p:nvPr/>
         </p:nvSpPr>
@@ -8122,7 +8309,7 @@
       </p:sp>
       <p:sp>
         <p:nvSpPr>
-          <p:cNvPr id="719076157" name="Text 3"/>
+          <p:cNvPr id="1115869322" name="Text 3"/>
           <p:cNvSpPr/>
           <p:nvPr/>
         </p:nvSpPr>
@@ -8171,7 +8358,7 @@
       </p:sp>
       <p:sp>
         <p:nvSpPr>
-          <p:cNvPr id="1751056809" name="Text 4"/>
+          <p:cNvPr id="89818127" name="Text 4"/>
           <p:cNvSpPr/>
           <p:nvPr/>
         </p:nvSpPr>
@@ -8218,7 +8405,7 @@
       </p:sp>
       <p:sp>
         <p:nvSpPr>
-          <p:cNvPr id="1262100755" name="Text 5"/>
+          <p:cNvPr id="792221008" name="Text 5"/>
           <p:cNvSpPr/>
           <p:nvPr/>
         </p:nvSpPr>
@@ -8267,7 +8454,7 @@
       </p:sp>
       <p:sp>
         <p:nvSpPr>
-          <p:cNvPr id="1052394248" name="Text 6"/>
+          <p:cNvPr id="774108172" name="Text 6"/>
           <p:cNvSpPr/>
           <p:nvPr/>
         </p:nvSpPr>
@@ -8364,7 +8551,7 @@
       </p:sp>
       <p:sp>
         <p:nvSpPr>
-          <p:cNvPr id="2018259826" name="Text 7"/>
+          <p:cNvPr id="954232727" name="Text 7"/>
           <p:cNvSpPr/>
           <p:nvPr/>
         </p:nvSpPr>
@@ -8397,7 +8584,7 @@
       </p:sp>
       <p:sp>
         <p:nvSpPr>
-          <p:cNvPr id="540709825" name="Text 8"/>
+          <p:cNvPr id="410150357" name="Text 8"/>
           <p:cNvSpPr/>
           <p:nvPr/>
         </p:nvSpPr>
@@ -8480,7 +8667,7 @@
       </p:grpSpPr>
       <p:sp>
         <p:nvSpPr>
-          <p:cNvPr id="1089335233" name="Text 0"/>
+          <p:cNvPr id="1624264129" name="Text 0"/>
           <p:cNvSpPr/>
           <p:nvPr/>
         </p:nvSpPr>
@@ -8526,7 +8713,7 @@
       </p:sp>
       <p:sp>
         <p:nvSpPr>
-          <p:cNvPr id="1404862370" name="Text 1"/>
+          <p:cNvPr id="1964758168" name="Text 1"/>
           <p:cNvSpPr/>
           <p:nvPr/>
         </p:nvSpPr>
@@ -8575,7 +8762,7 @@
       </p:sp>
       <p:sp>
         <p:nvSpPr>
-          <p:cNvPr id="460125340" name="Text 2"/>
+          <p:cNvPr id="897742087" name="Text 2"/>
           <p:cNvSpPr/>
           <p:nvPr/>
         </p:nvSpPr>
@@ -8702,7 +8889,7 @@
       </p:sp>
       <p:sp>
         <p:nvSpPr>
-          <p:cNvPr id="596940829" name="Text 3"/>
+          <p:cNvPr id="2085206172" name="Text 3"/>
           <p:cNvSpPr/>
           <p:nvPr/>
         </p:nvSpPr>
@@ -8735,7 +8922,7 @@
       </p:sp>
       <p:sp>
         <p:nvSpPr>
-          <p:cNvPr id="777115626" name="Text 4"/>
+          <p:cNvPr id="1466437650" name="Text 4"/>
           <p:cNvSpPr/>
           <p:nvPr/>
         </p:nvSpPr>
@@ -8770,7 +8957,29 @@
                 <a:ea typeface="Arial"/>
                 <a:cs typeface="Arial"/>
               </a:rPr>
-              <a:t>GAS domina em Linux, MASM em Windows</a:t>
+              <a:t>GAS domina em Linux, </a:t>
+            </a:r>
+            <a:r>
+              <a:rPr lang="pt-BR" sz="1200">
+                <a:solidFill>
+                  <a:srgbClr val="FFFFFF"/>
+                </a:solidFill>
+                <a:latin typeface="Arial"/>
+                <a:ea typeface="Arial"/>
+                <a:cs typeface="Arial"/>
+              </a:rPr>
+              <a:t>M</a:t>
+            </a:r>
+            <a:r>
+              <a:rPr lang="en-US" sz="1200">
+                <a:solidFill>
+                  <a:srgbClr val="FFFFFF"/>
+                </a:solidFill>
+                <a:latin typeface="Arial"/>
+                <a:ea typeface="Arial"/>
+                <a:cs typeface="Arial"/>
+              </a:rPr>
+              <a:t>ASM em Windows</a:t>
             </a:r>
             <a:endParaRPr lang="en-US" sz="1200"/>
           </a:p>
@@ -8778,7 +8987,7 @@
       </p:sp>
       <p:sp>
         <p:nvSpPr>
-          <p:cNvPr id="1052281865" name="Text 5"/>
+          <p:cNvPr id="165974240" name="Text 5"/>
           <p:cNvSpPr/>
           <p:nvPr/>
         </p:nvSpPr>
@@ -8827,7 +9036,7 @@
       </p:sp>
       <p:sp>
         <p:nvSpPr>
-          <p:cNvPr id="1315967574" name="Text 6"/>
+          <p:cNvPr id="357928306" name="Text 6"/>
           <p:cNvSpPr/>
           <p:nvPr/>
         </p:nvSpPr>

</xml_diff>